<commit_message>
Replaced releaf with React Blog
</commit_message>
<xml_diff>
--- a/Personal Website/img/powerpoint.pptx
+++ b/Personal Website/img/powerpoint.pptx
@@ -8,6 +8,7 @@
     <p:sldId id="256" r:id="rId2"/>
     <p:sldId id="257" r:id="rId3"/>
     <p:sldId id="258" r:id="rId4"/>
+    <p:sldId id="259" r:id="rId5"/>
   </p:sldIdLst>
   <p:sldSz cx="12192000" cy="6858000"/>
   <p:notesSz cx="6858000" cy="9144000"/>
@@ -114,6 +115,107 @@
 </p:presentation>
 </file>
 
+<file path=ppt/revisionInfo.xml><?xml version="1.0" encoding="utf-8"?>
+<p1510:revInfo xmlns:a="http://schemas.openxmlformats.org/drawingml/2006/main" xmlns:r="http://schemas.openxmlformats.org/officeDocument/2006/relationships" xmlns:p1510="http://schemas.microsoft.com/office/powerpoint/2015/10/main">
+  <p1510:revLst>
+    <p1510:client id="{BD324C7F-2E9E-464C-92CF-90D70429CD4B}" v="20" dt="2020-04-28T06:38:48.076"/>
+  </p1510:revLst>
+</p1510:revInfo>
+</file>
+
+<file path=ppt/changesInfos/changesInfo1.xml><?xml version="1.0" encoding="utf-8"?>
+<pc:chgInfo xmlns:a="http://schemas.openxmlformats.org/drawingml/2006/main" xmlns:r="http://schemas.openxmlformats.org/officeDocument/2006/relationships" xmlns:ac="http://schemas.microsoft.com/office/drawing/2013/main/command" xmlns:pc="http://schemas.microsoft.com/office/powerpoint/2013/main/command">
+  <pc:docChgLst>
+    <pc:chgData name="Akinori Saito" userId="0873111f42e0c9ee" providerId="LiveId" clId="{BD324C7F-2E9E-464C-92CF-90D70429CD4B}"/>
+    <pc:docChg chg="undo custSel addSld modSld">
+      <pc:chgData name="Akinori Saito" userId="0873111f42e0c9ee" providerId="LiveId" clId="{BD324C7F-2E9E-464C-92CF-90D70429CD4B}" dt="2020-04-28T06:38:48.076" v="46" actId="164"/>
+      <pc:docMkLst>
+        <pc:docMk/>
+      </pc:docMkLst>
+      <pc:sldChg chg="addSp delSp modSp new setBg">
+        <pc:chgData name="Akinori Saito" userId="0873111f42e0c9ee" providerId="LiveId" clId="{BD324C7F-2E9E-464C-92CF-90D70429CD4B}" dt="2020-04-28T06:38:48.076" v="46" actId="164"/>
+        <pc:sldMkLst>
+          <pc:docMk/>
+          <pc:sldMk cId="707849098" sldId="259"/>
+        </pc:sldMkLst>
+        <pc:spChg chg="del">
+          <ac:chgData name="Akinori Saito" userId="0873111f42e0c9ee" providerId="LiveId" clId="{BD324C7F-2E9E-464C-92CF-90D70429CD4B}" dt="2020-04-28T06:29:40.432" v="1" actId="478"/>
+          <ac:spMkLst>
+            <pc:docMk/>
+            <pc:sldMk cId="707849098" sldId="259"/>
+            <ac:spMk id="2" creationId="{05FDF261-1FFC-47F7-A45D-5A15B8A1F206}"/>
+          </ac:spMkLst>
+        </pc:spChg>
+        <pc:spChg chg="del">
+          <ac:chgData name="Akinori Saito" userId="0873111f42e0c9ee" providerId="LiveId" clId="{BD324C7F-2E9E-464C-92CF-90D70429CD4B}" dt="2020-04-28T06:29:40.432" v="1" actId="478"/>
+          <ac:spMkLst>
+            <pc:docMk/>
+            <pc:sldMk cId="707849098" sldId="259"/>
+            <ac:spMk id="3" creationId="{992ECB4F-CD40-441C-B4C7-256F502ED1B0}"/>
+          </ac:spMkLst>
+        </pc:spChg>
+        <pc:spChg chg="add mod topLvl">
+          <ac:chgData name="Akinori Saito" userId="0873111f42e0c9ee" providerId="LiveId" clId="{BD324C7F-2E9E-464C-92CF-90D70429CD4B}" dt="2020-04-28T06:34:43.414" v="40" actId="164"/>
+          <ac:spMkLst>
+            <pc:docMk/>
+            <pc:sldMk cId="707849098" sldId="259"/>
+            <ac:spMk id="4" creationId="{DA559283-199E-4C70-8BD7-6ED8BED95611}"/>
+          </ac:spMkLst>
+        </pc:spChg>
+        <pc:grpChg chg="add del mod">
+          <ac:chgData name="Akinori Saito" userId="0873111f42e0c9ee" providerId="LiveId" clId="{BD324C7F-2E9E-464C-92CF-90D70429CD4B}" dt="2020-04-28T06:34:25.220" v="36" actId="165"/>
+          <ac:grpSpMkLst>
+            <pc:docMk/>
+            <pc:sldMk cId="707849098" sldId="259"/>
+            <ac:grpSpMk id="5" creationId="{1A9BD2AB-B9C4-4591-8B97-17FF0E55D4EF}"/>
+          </ac:grpSpMkLst>
+        </pc:grpChg>
+        <pc:grpChg chg="add mod">
+          <ac:chgData name="Akinori Saito" userId="0873111f42e0c9ee" providerId="LiveId" clId="{BD324C7F-2E9E-464C-92CF-90D70429CD4B}" dt="2020-04-28T06:38:48.076" v="46" actId="164"/>
+          <ac:grpSpMkLst>
+            <pc:docMk/>
+            <pc:sldMk cId="707849098" sldId="259"/>
+            <ac:grpSpMk id="8" creationId="{5055806C-241E-4A7F-B693-E0092065E657}"/>
+          </ac:grpSpMkLst>
+        </pc:grpChg>
+        <pc:grpChg chg="add mod">
+          <ac:chgData name="Akinori Saito" userId="0873111f42e0c9ee" providerId="LiveId" clId="{BD324C7F-2E9E-464C-92CF-90D70429CD4B}" dt="2020-04-28T06:38:48.076" v="46" actId="164"/>
+          <ac:grpSpMkLst>
+            <pc:docMk/>
+            <pc:sldMk cId="707849098" sldId="259"/>
+            <ac:grpSpMk id="11" creationId="{F77CDC58-258B-4345-B144-729A35F0A30A}"/>
+          </ac:grpSpMkLst>
+        </pc:grpChg>
+        <pc:picChg chg="add mod ord modCrop">
+          <ac:chgData name="Akinori Saito" userId="0873111f42e0c9ee" providerId="LiveId" clId="{BD324C7F-2E9E-464C-92CF-90D70429CD4B}" dt="2020-04-28T06:34:50.455" v="41"/>
+          <ac:picMkLst>
+            <pc:docMk/>
+            <pc:sldMk cId="707849098" sldId="259"/>
+            <ac:picMk id="7" creationId="{E49930D9-F445-4EDC-982C-65B67587BAB8}"/>
+          </ac:picMkLst>
+        </pc:picChg>
+        <pc:picChg chg="add mod">
+          <ac:chgData name="Akinori Saito" userId="0873111f42e0c9ee" providerId="LiveId" clId="{BD324C7F-2E9E-464C-92CF-90D70429CD4B}" dt="2020-04-28T06:38:48.076" v="46" actId="164"/>
+          <ac:picMkLst>
+            <pc:docMk/>
+            <pc:sldMk cId="707849098" sldId="259"/>
+            <ac:picMk id="10" creationId="{52D7A2C0-CA80-42AF-9470-1B410AD84838}"/>
+          </ac:picMkLst>
+        </pc:picChg>
+        <pc:picChg chg="add mod topLvl">
+          <ac:chgData name="Akinori Saito" userId="0873111f42e0c9ee" providerId="LiveId" clId="{BD324C7F-2E9E-464C-92CF-90D70429CD4B}" dt="2020-04-28T06:34:25.220" v="36" actId="165"/>
+          <ac:picMkLst>
+            <pc:docMk/>
+            <pc:sldMk cId="707849098" sldId="259"/>
+            <ac:picMk id="1026" creationId="{B1DE9B64-2D98-4210-8383-281D94B5AA7C}"/>
+          </ac:picMkLst>
+        </pc:picChg>
+      </pc:sldChg>
+    </pc:docChg>
+  </pc:docChgLst>
+</pc:chgInfo>
+</file>
+
 <file path=ppt/slideLayouts/slideLayout1.xml><?xml version="1.0" encoding="utf-8"?>
 <p:sldLayout xmlns:a="http://schemas.openxmlformats.org/drawingml/2006/main" xmlns:r="http://schemas.openxmlformats.org/officeDocument/2006/relationships" xmlns:p="http://schemas.openxmlformats.org/presentationml/2006/main" type="title" preserve="1">
   <p:cSld name="Title Slide">
@@ -261,7 +363,7 @@
           <a:p>
             <a:fld id="{F40FF59C-A762-4044-9BAB-2AE77399155B}" type="datetimeFigureOut">
               <a:rPr lang="en-US" smtClean="0"/>
-              <a:t>10/22/2019</a:t>
+              <a:t>4/27/2020</a:t>
             </a:fld>
             <a:endParaRPr lang="en-US"/>
           </a:p>
@@ -459,7 +561,7 @@
           <a:p>
             <a:fld id="{F40FF59C-A762-4044-9BAB-2AE77399155B}" type="datetimeFigureOut">
               <a:rPr lang="en-US" smtClean="0"/>
-              <a:t>10/22/2019</a:t>
+              <a:t>4/27/2020</a:t>
             </a:fld>
             <a:endParaRPr lang="en-US"/>
           </a:p>
@@ -667,7 +769,7 @@
           <a:p>
             <a:fld id="{F40FF59C-A762-4044-9BAB-2AE77399155B}" type="datetimeFigureOut">
               <a:rPr lang="en-US" smtClean="0"/>
-              <a:t>10/22/2019</a:t>
+              <a:t>4/27/2020</a:t>
             </a:fld>
             <a:endParaRPr lang="en-US"/>
           </a:p>
@@ -865,7 +967,7 @@
           <a:p>
             <a:fld id="{F40FF59C-A762-4044-9BAB-2AE77399155B}" type="datetimeFigureOut">
               <a:rPr lang="en-US" smtClean="0"/>
-              <a:t>10/22/2019</a:t>
+              <a:t>4/27/2020</a:t>
             </a:fld>
             <a:endParaRPr lang="en-US"/>
           </a:p>
@@ -1140,7 +1242,7 @@
           <a:p>
             <a:fld id="{F40FF59C-A762-4044-9BAB-2AE77399155B}" type="datetimeFigureOut">
               <a:rPr lang="en-US" smtClean="0"/>
-              <a:t>10/22/2019</a:t>
+              <a:t>4/27/2020</a:t>
             </a:fld>
             <a:endParaRPr lang="en-US"/>
           </a:p>
@@ -1405,7 +1507,7 @@
           <a:p>
             <a:fld id="{F40FF59C-A762-4044-9BAB-2AE77399155B}" type="datetimeFigureOut">
               <a:rPr lang="en-US" smtClean="0"/>
-              <a:t>10/22/2019</a:t>
+              <a:t>4/27/2020</a:t>
             </a:fld>
             <a:endParaRPr lang="en-US"/>
           </a:p>
@@ -1817,7 +1919,7 @@
           <a:p>
             <a:fld id="{F40FF59C-A762-4044-9BAB-2AE77399155B}" type="datetimeFigureOut">
               <a:rPr lang="en-US" smtClean="0"/>
-              <a:t>10/22/2019</a:t>
+              <a:t>4/27/2020</a:t>
             </a:fld>
             <a:endParaRPr lang="en-US"/>
           </a:p>
@@ -1958,7 +2060,7 @@
           <a:p>
             <a:fld id="{F40FF59C-A762-4044-9BAB-2AE77399155B}" type="datetimeFigureOut">
               <a:rPr lang="en-US" smtClean="0"/>
-              <a:t>10/22/2019</a:t>
+              <a:t>4/27/2020</a:t>
             </a:fld>
             <a:endParaRPr lang="en-US"/>
           </a:p>
@@ -2071,7 +2173,7 @@
           <a:p>
             <a:fld id="{F40FF59C-A762-4044-9BAB-2AE77399155B}" type="datetimeFigureOut">
               <a:rPr lang="en-US" smtClean="0"/>
-              <a:t>10/22/2019</a:t>
+              <a:t>4/27/2020</a:t>
             </a:fld>
             <a:endParaRPr lang="en-US"/>
           </a:p>
@@ -2382,7 +2484,7 @@
           <a:p>
             <a:fld id="{F40FF59C-A762-4044-9BAB-2AE77399155B}" type="datetimeFigureOut">
               <a:rPr lang="en-US" smtClean="0"/>
-              <a:t>10/22/2019</a:t>
+              <a:t>4/27/2020</a:t>
             </a:fld>
             <a:endParaRPr lang="en-US"/>
           </a:p>
@@ -2670,7 +2772,7 @@
           <a:p>
             <a:fld id="{F40FF59C-A762-4044-9BAB-2AE77399155B}" type="datetimeFigureOut">
               <a:rPr lang="en-US" smtClean="0"/>
-              <a:t>10/22/2019</a:t>
+              <a:t>4/27/2020</a:t>
             </a:fld>
             <a:endParaRPr lang="en-US"/>
           </a:p>
@@ -2911,7 +3013,7 @@
           <a:p>
             <a:fld id="{F40FF59C-A762-4044-9BAB-2AE77399155B}" type="datetimeFigureOut">
               <a:rPr lang="en-US" smtClean="0"/>
-              <a:t>10/22/2019</a:t>
+              <a:t>4/27/2020</a:t>
             </a:fld>
             <a:endParaRPr lang="en-US"/>
           </a:p>
@@ -5668,6 +5770,274 @@
 </p:sld>
 </file>
 
+<file path=ppt/slides/slide4.xml><?xml version="1.0" encoding="utf-8"?>
+<p:sld xmlns:a="http://schemas.openxmlformats.org/drawingml/2006/main" xmlns:r="http://schemas.openxmlformats.org/officeDocument/2006/relationships" xmlns:p="http://schemas.openxmlformats.org/presentationml/2006/main">
+  <p:cSld>
+    <p:bg>
+      <p:bgPr>
+        <a:solidFill>
+          <a:schemeClr val="bg1">
+            <a:lumMod val="85000"/>
+          </a:schemeClr>
+        </a:solidFill>
+        <a:effectLst/>
+      </p:bgPr>
+    </p:bg>
+    <p:spTree>
+      <p:nvGrpSpPr>
+        <p:cNvPr id="1" name=""/>
+        <p:cNvGrpSpPr/>
+        <p:nvPr/>
+      </p:nvGrpSpPr>
+      <p:grpSpPr>
+        <a:xfrm>
+          <a:off x="0" y="0"/>
+          <a:ext cx="0" cy="0"/>
+          <a:chOff x="0" y="0"/>
+          <a:chExt cx="0" cy="0"/>
+        </a:xfrm>
+      </p:grpSpPr>
+      <p:pic>
+        <p:nvPicPr>
+          <p:cNvPr id="1026" name="Picture 2" descr="React (web framework) - Wikipedia">
+            <a:extLst>
+              <a:ext uri="{FF2B5EF4-FFF2-40B4-BE49-F238E27FC236}">
+                <a16:creationId xmlns:a16="http://schemas.microsoft.com/office/drawing/2014/main" id="{B1DE9B64-2D98-4210-8383-281D94B5AA7C}"/>
+              </a:ext>
+            </a:extLst>
+          </p:cNvPr>
+          <p:cNvPicPr>
+            <a:picLocks noChangeAspect="1" noChangeArrowheads="1"/>
+          </p:cNvPicPr>
+          <p:nvPr/>
+        </p:nvPicPr>
+        <p:blipFill>
+          <a:blip r:embed="rId2">
+            <a:clrChange>
+              <a:clrFrom>
+                <a:srgbClr val="FFFFFF"/>
+              </a:clrFrom>
+              <a:clrTo>
+                <a:srgbClr val="FFFFFF">
+                  <a:alpha val="0"/>
+                </a:srgbClr>
+              </a:clrTo>
+            </a:clrChange>
+            <a:extLst>
+              <a:ext uri="{28A0092B-C50C-407E-A947-70E740481C1C}">
+                <a14:useLocalDpi xmlns:a14="http://schemas.microsoft.com/office/drawing/2010/main" val="0"/>
+              </a:ext>
+            </a:extLst>
+          </a:blip>
+          <a:srcRect/>
+          <a:stretch>
+            <a:fillRect/>
+          </a:stretch>
+        </p:blipFill>
+        <p:spPr bwMode="auto">
+          <a:xfrm>
+            <a:off x="5300930" y="1253705"/>
+            <a:ext cx="2543175" cy="1800225"/>
+          </a:xfrm>
+          <a:prstGeom prst="rect">
+            <a:avLst/>
+          </a:prstGeom>
+          <a:solidFill>
+            <a:schemeClr val="bg1"/>
+          </a:solidFill>
+          <a:extLst>
+            <a:ext uri="{909E8E84-426E-40DD-AFC4-6F175D3DCCD1}">
+              <a14:hiddenFill xmlns:a14="http://schemas.microsoft.com/office/drawing/2010/main">
+                <a:solidFill>
+                  <a:srgbClr val="FFFFFF"/>
+                </a:solidFill>
+              </a14:hiddenFill>
+            </a:ext>
+          </a:extLst>
+        </p:spPr>
+      </p:pic>
+      <p:grpSp>
+        <p:nvGrpSpPr>
+          <p:cNvPr id="11" name="Group 10">
+            <a:extLst>
+              <a:ext uri="{FF2B5EF4-FFF2-40B4-BE49-F238E27FC236}">
+                <a16:creationId xmlns:a16="http://schemas.microsoft.com/office/drawing/2014/main" id="{F77CDC58-258B-4345-B144-729A35F0A30A}"/>
+              </a:ext>
+            </a:extLst>
+          </p:cNvPr>
+          <p:cNvGrpSpPr/>
+          <p:nvPr/>
+        </p:nvGrpSpPr>
+        <p:grpSpPr>
+          <a:xfrm>
+            <a:off x="2052693" y="867741"/>
+            <a:ext cx="3121158" cy="2370855"/>
+            <a:chOff x="2052693" y="867741"/>
+            <a:chExt cx="3121158" cy="2370855"/>
+          </a:xfrm>
+        </p:grpSpPr>
+        <p:grpSp>
+          <p:nvGrpSpPr>
+            <p:cNvPr id="8" name="Group 7">
+              <a:extLst>
+                <a:ext uri="{FF2B5EF4-FFF2-40B4-BE49-F238E27FC236}">
+                  <a16:creationId xmlns:a16="http://schemas.microsoft.com/office/drawing/2014/main" id="{5055806C-241E-4A7F-B693-E0092065E657}"/>
+                </a:ext>
+              </a:extLst>
+            </p:cNvPr>
+            <p:cNvGrpSpPr/>
+            <p:nvPr/>
+          </p:nvGrpSpPr>
+          <p:grpSpPr>
+            <a:xfrm>
+              <a:off x="2052693" y="867741"/>
+              <a:ext cx="3121158" cy="2370855"/>
+              <a:chOff x="2052693" y="867741"/>
+              <a:chExt cx="3121158" cy="2370855"/>
+            </a:xfrm>
+          </p:grpSpPr>
+          <p:pic>
+            <p:nvPicPr>
+              <p:cNvPr id="7" name="Picture 6" descr="A picture containing window&#10;&#10;Description automatically generated">
+                <a:extLst>
+                  <a:ext uri="{FF2B5EF4-FFF2-40B4-BE49-F238E27FC236}">
+                    <a16:creationId xmlns:a16="http://schemas.microsoft.com/office/drawing/2014/main" id="{E49930D9-F445-4EDC-982C-65B67587BAB8}"/>
+                  </a:ext>
+                </a:extLst>
+              </p:cNvPr>
+              <p:cNvPicPr>
+                <a:picLocks noChangeAspect="1"/>
+              </p:cNvPicPr>
+              <p:nvPr/>
+            </p:nvPicPr>
+            <p:blipFill rotWithShape="1">
+              <a:blip r:embed="rId3">
+                <a:clrChange>
+                  <a:clrFrom>
+                    <a:srgbClr val="000000">
+                      <a:alpha val="0"/>
+                    </a:srgbClr>
+                  </a:clrFrom>
+                  <a:clrTo>
+                    <a:srgbClr val="000000">
+                      <a:alpha val="0"/>
+                    </a:srgbClr>
+                  </a:clrTo>
+                </a:clrChange>
+                <a:extLst>
+                  <a:ext uri="{28A0092B-C50C-407E-A947-70E740481C1C}">
+                    <a14:useLocalDpi xmlns:a14="http://schemas.microsoft.com/office/drawing/2010/main" val="0"/>
+                  </a:ext>
+                </a:extLst>
+              </a:blip>
+              <a:srcRect b="29955"/>
+              <a:stretch/>
+            </p:blipFill>
+            <p:spPr>
+              <a:xfrm>
+                <a:off x="2052693" y="867741"/>
+                <a:ext cx="3121158" cy="2186189"/>
+              </a:xfrm>
+              <a:prstGeom prst="rect">
+                <a:avLst/>
+              </a:prstGeom>
+              <a:solidFill>
+                <a:schemeClr val="bg1"/>
+              </a:solidFill>
+            </p:spPr>
+          </p:pic>
+          <p:sp>
+            <p:nvSpPr>
+              <p:cNvPr id="4" name="TextBox 3">
+                <a:extLst>
+                  <a:ext uri="{FF2B5EF4-FFF2-40B4-BE49-F238E27FC236}">
+                    <a16:creationId xmlns:a16="http://schemas.microsoft.com/office/drawing/2014/main" id="{DA559283-199E-4C70-8BD7-6ED8BED95611}"/>
+                  </a:ext>
+                </a:extLst>
+              </p:cNvPr>
+              <p:cNvSpPr txBox="1"/>
+              <p:nvPr/>
+            </p:nvSpPr>
+            <p:spPr>
+              <a:xfrm>
+                <a:off x="2827661" y="2869264"/>
+                <a:ext cx="1571222" cy="369332"/>
+              </a:xfrm>
+              <a:prstGeom prst="rect">
+                <a:avLst/>
+              </a:prstGeom>
+              <a:solidFill>
+                <a:schemeClr val="bg1"/>
+              </a:solidFill>
+            </p:spPr>
+            <p:txBody>
+              <a:bodyPr wrap="square" rtlCol="0">
+                <a:spAutoFit/>
+              </a:bodyPr>
+              <a:lstStyle/>
+              <a:p>
+                <a:pPr algn="ctr"/>
+                <a:r>
+                  <a:rPr lang="en-US" dirty="0"/>
+                  <a:t>My Blog</a:t>
+                </a:r>
+              </a:p>
+            </p:txBody>
+          </p:sp>
+        </p:grpSp>
+        <p:pic>
+          <p:nvPicPr>
+            <p:cNvPr id="10" name="Graphic 9" descr="Back">
+              <a:extLst>
+                <a:ext uri="{FF2B5EF4-FFF2-40B4-BE49-F238E27FC236}">
+                  <a16:creationId xmlns:a16="http://schemas.microsoft.com/office/drawing/2014/main" id="{52D7A2C0-CA80-42AF-9470-1B410AD84838}"/>
+                </a:ext>
+              </a:extLst>
+            </p:cNvPr>
+            <p:cNvPicPr>
+              <a:picLocks noChangeAspect="1"/>
+            </p:cNvPicPr>
+            <p:nvPr/>
+          </p:nvPicPr>
+          <p:blipFill>
+            <a:blip r:embed="rId4">
+              <a:extLst>
+                <a:ext uri="{28A0092B-C50C-407E-A947-70E740481C1C}">
+                  <a14:useLocalDpi xmlns:a14="http://schemas.microsoft.com/office/drawing/2010/main" val="0"/>
+                </a:ext>
+                <a:ext uri="{96DAC541-7B7A-43D3-8B79-37D633B846F1}">
+                  <asvg:svgBlip xmlns:asvg="http://schemas.microsoft.com/office/drawing/2016/SVG/main" r:embed="rId5"/>
+                </a:ext>
+              </a:extLst>
+            </a:blip>
+            <a:stretch>
+              <a:fillRect/>
+            </a:stretch>
+          </p:blipFill>
+          <p:spPr>
+            <a:xfrm>
+              <a:off x="4024273" y="2925342"/>
+              <a:ext cx="257175" cy="257175"/>
+            </a:xfrm>
+            <a:prstGeom prst="rect">
+              <a:avLst/>
+            </a:prstGeom>
+          </p:spPr>
+        </p:pic>
+      </p:grpSp>
+    </p:spTree>
+    <p:extLst>
+      <p:ext uri="{BB962C8B-B14F-4D97-AF65-F5344CB8AC3E}">
+        <p14:creationId xmlns:p14="http://schemas.microsoft.com/office/powerpoint/2010/main" val="707849098"/>
+      </p:ext>
+    </p:extLst>
+  </p:cSld>
+  <p:clrMapOvr>
+    <a:masterClrMapping/>
+  </p:clrMapOvr>
+</p:sld>
+</file>
+
 <file path=ppt/theme/theme1.xml><?xml version="1.0" encoding="utf-8"?>
 <a:theme xmlns:a="http://schemas.openxmlformats.org/drawingml/2006/main" name="Office Theme">
   <a:themeElements>

</xml_diff>